<commit_message>
1. Rebuild ROM.v & RAM.v 2. Cancel the clock pin in GP_registers.v, PC_adder.v & ALU.v 3. Unused module deleted. 4. Other optimizations.
</commit_message>
<xml_diff>
--- a/32bit_RiscV_desidn/InstructionSet2.pptx
+++ b/32bit_RiscV_desidn/InstructionSet2.pptx
@@ -122,13 +122,28 @@
 <pc:chgInfo xmlns:a="http://schemas.openxmlformats.org/drawingml/2006/main" xmlns:r="http://schemas.openxmlformats.org/officeDocument/2006/relationships" xmlns:ac="http://schemas.microsoft.com/office/drawing/2013/main/command" xmlns:pc="http://schemas.microsoft.com/office/powerpoint/2013/main/command">
   <pc:docChgLst>
     <pc:chgData name="Laboratories Aperture Science" userId="4ef7ff3058e5cb20" providerId="LiveId" clId="{DBCA5898-EFF5-CC4E-AB83-A82E59F27925}"/>
-    <pc:docChg chg="modSld">
-      <pc:chgData name="Laboratories Aperture Science" userId="4ef7ff3058e5cb20" providerId="LiveId" clId="{DBCA5898-EFF5-CC4E-AB83-A82E59F27925}" dt="2024-03-26T12:01:36.429" v="10" actId="1076"/>
+    <pc:docChg chg="custSel modSld">
+      <pc:chgData name="Laboratories Aperture Science" userId="4ef7ff3058e5cb20" providerId="LiveId" clId="{DBCA5898-EFF5-CC4E-AB83-A82E59F27925}" dt="2024-05-03T16:12:42.013" v="46" actId="20577"/>
       <pc:docMkLst>
         <pc:docMk/>
       </pc:docMkLst>
       <pc:sldChg chg="modSp mod">
-        <pc:chgData name="Laboratories Aperture Science" userId="4ef7ff3058e5cb20" providerId="LiveId" clId="{DBCA5898-EFF5-CC4E-AB83-A82E59F27925}" dt="2024-03-26T12:01:36.429" v="10" actId="1076"/>
+        <pc:chgData name="Laboratories Aperture Science" userId="4ef7ff3058e5cb20" providerId="LiveId" clId="{DBCA5898-EFF5-CC4E-AB83-A82E59F27925}" dt="2024-05-03T16:11:34.127" v="16" actId="20577"/>
+        <pc:sldMkLst>
+          <pc:docMk/>
+          <pc:sldMk cId="666222374" sldId="256"/>
+        </pc:sldMkLst>
+        <pc:graphicFrameChg chg="mod modGraphic">
+          <ac:chgData name="Laboratories Aperture Science" userId="4ef7ff3058e5cb20" providerId="LiveId" clId="{DBCA5898-EFF5-CC4E-AB83-A82E59F27925}" dt="2024-05-03T16:11:34.127" v="16" actId="20577"/>
+          <ac:graphicFrameMkLst>
+            <pc:docMk/>
+            <pc:sldMk cId="666222374" sldId="256"/>
+            <ac:graphicFrameMk id="47" creationId="{D8B6A41C-B9C9-BD20-BF2B-02E3C640962E}"/>
+          </ac:graphicFrameMkLst>
+        </pc:graphicFrameChg>
+      </pc:sldChg>
+      <pc:sldChg chg="modSp mod">
+        <pc:chgData name="Laboratories Aperture Science" userId="4ef7ff3058e5cb20" providerId="LiveId" clId="{DBCA5898-EFF5-CC4E-AB83-A82E59F27925}" dt="2024-05-03T16:12:42.013" v="46" actId="20577"/>
         <pc:sldMkLst>
           <pc:docMk/>
           <pc:sldMk cId="1801106850" sldId="257"/>
@@ -149,6 +164,29 @@
             <ac:spMk id="73" creationId="{347423E3-C5F4-9CBE-8289-DC8F5896DFDE}"/>
           </ac:spMkLst>
         </pc:spChg>
+        <pc:graphicFrameChg chg="modGraphic">
+          <ac:chgData name="Laboratories Aperture Science" userId="4ef7ff3058e5cb20" providerId="LiveId" clId="{DBCA5898-EFF5-CC4E-AB83-A82E59F27925}" dt="2024-05-03T16:12:42.013" v="46" actId="20577"/>
+          <ac:graphicFrameMkLst>
+            <pc:docMk/>
+            <pc:sldMk cId="1801106850" sldId="257"/>
+            <ac:graphicFrameMk id="2" creationId="{26ADB7FB-1A07-AE16-1502-33260A07029E}"/>
+          </ac:graphicFrameMkLst>
+        </pc:graphicFrameChg>
+      </pc:sldChg>
+      <pc:sldChg chg="modSp mod">
+        <pc:chgData name="Laboratories Aperture Science" userId="4ef7ff3058e5cb20" providerId="LiveId" clId="{DBCA5898-EFF5-CC4E-AB83-A82E59F27925}" dt="2024-05-03T16:11:55.544" v="25" actId="20577"/>
+        <pc:sldMkLst>
+          <pc:docMk/>
+          <pc:sldMk cId="4019224512" sldId="259"/>
+        </pc:sldMkLst>
+        <pc:graphicFrameChg chg="modGraphic">
+          <ac:chgData name="Laboratories Aperture Science" userId="4ef7ff3058e5cb20" providerId="LiveId" clId="{DBCA5898-EFF5-CC4E-AB83-A82E59F27925}" dt="2024-05-03T16:11:55.544" v="25" actId="20577"/>
+          <ac:graphicFrameMkLst>
+            <pc:docMk/>
+            <pc:sldMk cId="4019224512" sldId="259"/>
+            <ac:graphicFrameMk id="47" creationId="{D8B6A41C-B9C9-BD20-BF2B-02E3C640962E}"/>
+          </ac:graphicFrameMkLst>
+        </pc:graphicFrameChg>
       </pc:sldChg>
     </pc:docChg>
   </pc:docChgLst>
@@ -237,7 +275,7 @@
           <a:p>
             <a:fld id="{307BE4C1-AB1C-CC4D-BDA0-6D4C43B15708}" type="datetimeFigureOut">
               <a:rPr lang="en-CN" smtClean="0"/>
-              <a:t>2024/3/26</a:t>
+              <a:t>2024/5/4</a:t>
             </a:fld>
             <a:endParaRPr lang="en-CN"/>
           </a:p>
@@ -906,7 +944,7 @@
           <a:p>
             <a:fld id="{0DE1D6E4-8E28-744C-9522-E5BB11566C2E}" type="datetimeFigureOut">
               <a:rPr lang="en-CN" smtClean="0"/>
-              <a:t>2024/3/26</a:t>
+              <a:t>2024/5/4</a:t>
             </a:fld>
             <a:endParaRPr lang="en-CN"/>
           </a:p>
@@ -1106,7 +1144,7 @@
           <a:p>
             <a:fld id="{0DE1D6E4-8E28-744C-9522-E5BB11566C2E}" type="datetimeFigureOut">
               <a:rPr lang="en-CN" smtClean="0"/>
-              <a:t>2024/3/26</a:t>
+              <a:t>2024/5/4</a:t>
             </a:fld>
             <a:endParaRPr lang="en-CN"/>
           </a:p>
@@ -1316,7 +1354,7 @@
           <a:p>
             <a:fld id="{0DE1D6E4-8E28-744C-9522-E5BB11566C2E}" type="datetimeFigureOut">
               <a:rPr lang="en-CN" smtClean="0"/>
-              <a:t>2024/3/26</a:t>
+              <a:t>2024/5/4</a:t>
             </a:fld>
             <a:endParaRPr lang="en-CN"/>
           </a:p>
@@ -1516,7 +1554,7 @@
           <a:p>
             <a:fld id="{0DE1D6E4-8E28-744C-9522-E5BB11566C2E}" type="datetimeFigureOut">
               <a:rPr lang="en-CN" smtClean="0"/>
-              <a:t>2024/3/26</a:t>
+              <a:t>2024/5/4</a:t>
             </a:fld>
             <a:endParaRPr lang="en-CN"/>
           </a:p>
@@ -1792,7 +1830,7 @@
           <a:p>
             <a:fld id="{0DE1D6E4-8E28-744C-9522-E5BB11566C2E}" type="datetimeFigureOut">
               <a:rPr lang="en-CN" smtClean="0"/>
-              <a:t>2024/3/26</a:t>
+              <a:t>2024/5/4</a:t>
             </a:fld>
             <a:endParaRPr lang="en-CN"/>
           </a:p>
@@ -2060,7 +2098,7 @@
           <a:p>
             <a:fld id="{0DE1D6E4-8E28-744C-9522-E5BB11566C2E}" type="datetimeFigureOut">
               <a:rPr lang="en-CN" smtClean="0"/>
-              <a:t>2024/3/26</a:t>
+              <a:t>2024/5/4</a:t>
             </a:fld>
             <a:endParaRPr lang="en-CN"/>
           </a:p>
@@ -2475,7 +2513,7 @@
           <a:p>
             <a:fld id="{0DE1D6E4-8E28-744C-9522-E5BB11566C2E}" type="datetimeFigureOut">
               <a:rPr lang="en-CN" smtClean="0"/>
-              <a:t>2024/3/26</a:t>
+              <a:t>2024/5/4</a:t>
             </a:fld>
             <a:endParaRPr lang="en-CN"/>
           </a:p>
@@ -2617,7 +2655,7 @@
           <a:p>
             <a:fld id="{0DE1D6E4-8E28-744C-9522-E5BB11566C2E}" type="datetimeFigureOut">
               <a:rPr lang="en-CN" smtClean="0"/>
-              <a:t>2024/3/26</a:t>
+              <a:t>2024/5/4</a:t>
             </a:fld>
             <a:endParaRPr lang="en-CN"/>
           </a:p>
@@ -2730,7 +2768,7 @@
           <a:p>
             <a:fld id="{0DE1D6E4-8E28-744C-9522-E5BB11566C2E}" type="datetimeFigureOut">
               <a:rPr lang="en-CN" smtClean="0"/>
-              <a:t>2024/3/26</a:t>
+              <a:t>2024/5/4</a:t>
             </a:fld>
             <a:endParaRPr lang="en-CN"/>
           </a:p>
@@ -3043,7 +3081,7 @@
           <a:p>
             <a:fld id="{0DE1D6E4-8E28-744C-9522-E5BB11566C2E}" type="datetimeFigureOut">
               <a:rPr lang="en-CN" smtClean="0"/>
-              <a:t>2024/3/26</a:t>
+              <a:t>2024/5/4</a:t>
             </a:fld>
             <a:endParaRPr lang="en-CN"/>
           </a:p>
@@ -3332,7 +3370,7 @@
           <a:p>
             <a:fld id="{0DE1D6E4-8E28-744C-9522-E5BB11566C2E}" type="datetimeFigureOut">
               <a:rPr lang="en-CN" smtClean="0"/>
-              <a:t>2024/3/26</a:t>
+              <a:t>2024/5/4</a:t>
             </a:fld>
             <a:endParaRPr lang="en-CN"/>
           </a:p>
@@ -3575,7 +3613,7 @@
           <a:p>
             <a:fld id="{0DE1D6E4-8E28-744C-9522-E5BB11566C2E}" type="datetimeFigureOut">
               <a:rPr lang="en-CN" smtClean="0"/>
-              <a:t>2024/3/26</a:t>
+              <a:t>2024/5/4</a:t>
             </a:fld>
             <a:endParaRPr lang="en-CN"/>
           </a:p>
@@ -5621,7 +5659,7 @@
           <p:nvPr>
             <p:extLst>
               <p:ext uri="{D42A27DB-BD31-4B8C-83A1-F6EECF244321}">
-                <p14:modId xmlns:p14="http://schemas.microsoft.com/office/powerpoint/2010/main" val="3305852170"/>
+                <p14:modId xmlns:p14="http://schemas.microsoft.com/office/powerpoint/2010/main" val="2862179648"/>
               </p:ext>
             </p:extLst>
           </p:nvPr>
@@ -6073,8 +6111,35 @@
                           <a:latin typeface="DengXian Light" panose="02010600030101010101" pitchFamily="2" charset="-122"/>
                           <a:ea typeface="DengXian Light" panose="02010600030101010101" pitchFamily="2" charset="-122"/>
                         </a:rPr>
-                        <a:t>目标寄存器</a:t>
+                        <a:t>立即数</a:t>
                       </a:r>
+                      <a:r>
+                        <a:rPr lang="en-US" altLang="zh-CN" b="0" i="0" dirty="0">
+                          <a:ln>
+                            <a:solidFill>
+                              <a:schemeClr val="tx1"/>
+                            </a:solidFill>
+                          </a:ln>
+                          <a:solidFill>
+                            <a:schemeClr val="tx1"/>
+                          </a:solidFill>
+                          <a:latin typeface="DengXian Light" panose="02010600030101010101" pitchFamily="2" charset="-122"/>
+                          <a:ea typeface="DengXian Light" panose="02010600030101010101" pitchFamily="2" charset="-122"/>
+                        </a:rPr>
+                        <a:t>[4:0]</a:t>
+                      </a:r>
+                      <a:endParaRPr lang="zh-CN" altLang="en-US" b="0" i="0" dirty="0">
+                        <a:ln>
+                          <a:solidFill>
+                            <a:schemeClr val="tx1"/>
+                          </a:solidFill>
+                        </a:ln>
+                        <a:solidFill>
+                          <a:schemeClr val="tx1"/>
+                        </a:solidFill>
+                        <a:latin typeface="DengXian Light" panose="02010600030101010101" pitchFamily="2" charset="-122"/>
+                        <a:ea typeface="DengXian Light" panose="02010600030101010101" pitchFamily="2" charset="-122"/>
+                      </a:endParaRPr>
                     </a:p>
                   </a:txBody>
                   <a:tcPr>
@@ -6134,7 +6199,7 @@
                     <a:p>
                       <a:pPr algn="ctr"/>
                       <a:r>
-                        <a:rPr lang="zh-CN" altLang="en-US" b="0" i="0">
+                        <a:rPr lang="zh-CN" altLang="en-US" b="0" i="0" dirty="0">
                           <a:ln>
                             <a:solidFill>
                               <a:schemeClr val="tx1"/>
@@ -6148,18 +6213,6 @@
                         </a:rPr>
                         <a:t>操作码</a:t>
                       </a:r>
-                      <a:endParaRPr lang="zh-CN" altLang="en-US" b="0" i="0" dirty="0">
-                        <a:ln>
-                          <a:solidFill>
-                            <a:schemeClr val="tx1"/>
-                          </a:solidFill>
-                        </a:ln>
-                        <a:solidFill>
-                          <a:schemeClr val="tx1"/>
-                        </a:solidFill>
-                        <a:latin typeface="DengXian Light" panose="02010600030101010101" pitchFamily="2" charset="-122"/>
-                        <a:ea typeface="DengXian Light" panose="02010600030101010101" pitchFamily="2" charset="-122"/>
-                      </a:endParaRPr>
                     </a:p>
                   </a:txBody>
                   <a:tcPr>
@@ -7780,7 +7833,7 @@
           <p:nvPr>
             <p:extLst>
               <p:ext uri="{D42A27DB-BD31-4B8C-83A1-F6EECF244321}">
-                <p14:modId xmlns:p14="http://schemas.microsoft.com/office/powerpoint/2010/main" val="1493079604"/>
+                <p14:modId xmlns:p14="http://schemas.microsoft.com/office/powerpoint/2010/main" val="273353224"/>
               </p:ext>
             </p:extLst>
           </p:nvPr>
@@ -8355,8 +8408,35 @@
                           <a:latin typeface="DengXian Light" panose="02010600030101010101" pitchFamily="2" charset="-122"/>
                           <a:ea typeface="DengXian Light" panose="02010600030101010101" pitchFamily="2" charset="-122"/>
                         </a:rPr>
-                        <a:t>目标寄存器</a:t>
+                        <a:t>立即数</a:t>
                       </a:r>
+                      <a:r>
+                        <a:rPr lang="en-US" altLang="zh-CN" b="0" i="0" dirty="0">
+                          <a:ln>
+                            <a:solidFill>
+                              <a:schemeClr val="tx1"/>
+                            </a:solidFill>
+                          </a:ln>
+                          <a:solidFill>
+                            <a:schemeClr val="tx1"/>
+                          </a:solidFill>
+                          <a:latin typeface="DengXian Light" panose="02010600030101010101" pitchFamily="2" charset="-122"/>
+                          <a:ea typeface="DengXian Light" panose="02010600030101010101" pitchFamily="2" charset="-122"/>
+                        </a:rPr>
+                        <a:t>[4:1,11]</a:t>
+                      </a:r>
+                      <a:endParaRPr lang="zh-CN" altLang="en-US" b="0" i="0" dirty="0">
+                        <a:ln>
+                          <a:solidFill>
+                            <a:schemeClr val="tx1"/>
+                          </a:solidFill>
+                        </a:ln>
+                        <a:solidFill>
+                          <a:schemeClr val="tx1"/>
+                        </a:solidFill>
+                        <a:latin typeface="DengXian Light" panose="02010600030101010101" pitchFamily="2" charset="-122"/>
+                        <a:ea typeface="DengXian Light" panose="02010600030101010101" pitchFamily="2" charset="-122"/>
+                      </a:endParaRPr>
                     </a:p>
                   </a:txBody>
                   <a:tcPr>
@@ -8416,7 +8496,7 @@
                     <a:p>
                       <a:pPr algn="ctr"/>
                       <a:r>
-                        <a:rPr lang="zh-CN" altLang="en-US" b="0" i="0">
+                        <a:rPr lang="zh-CN" altLang="en-US" b="0" i="0" dirty="0">
                           <a:ln>
                             <a:solidFill>
                               <a:schemeClr val="tx1"/>
@@ -8430,18 +8510,6 @@
                         </a:rPr>
                         <a:t>操作码</a:t>
                       </a:r>
-                      <a:endParaRPr lang="zh-CN" altLang="en-US" b="0" i="0" dirty="0">
-                        <a:ln>
-                          <a:solidFill>
-                            <a:schemeClr val="tx1"/>
-                          </a:solidFill>
-                        </a:ln>
-                        <a:solidFill>
-                          <a:schemeClr val="tx1"/>
-                        </a:solidFill>
-                        <a:latin typeface="DengXian Light" panose="02010600030101010101" pitchFamily="2" charset="-122"/>
-                        <a:ea typeface="DengXian Light" panose="02010600030101010101" pitchFamily="2" charset="-122"/>
-                      </a:endParaRPr>
                     </a:p>
                   </a:txBody>
                   <a:tcPr>
@@ -12422,7 +12490,7 @@
           <p:nvPr>
             <p:extLst>
               <p:ext uri="{D42A27DB-BD31-4B8C-83A1-F6EECF244321}">
-                <p14:modId xmlns:p14="http://schemas.microsoft.com/office/powerpoint/2010/main" val="1586403606"/>
+                <p14:modId xmlns:p14="http://schemas.microsoft.com/office/powerpoint/2010/main" val="463973198"/>
               </p:ext>
             </p:extLst>
           </p:nvPr>
@@ -12856,7 +12924,22 @@
                           <a:latin typeface="DengXian Light" panose="02010600030101010101" pitchFamily="2" charset="-122"/>
                           <a:ea typeface="DengXian Light" panose="02010600030101010101" pitchFamily="2" charset="-122"/>
                         </a:rPr>
-                        <a:t>rd</a:t>
+                        <a:t>Imm</a:t>
+                      </a:r>
+                      <a:r>
+                        <a:rPr lang="en-US" altLang="zh-CN" b="0" i="0" dirty="0">
+                          <a:ln>
+                            <a:solidFill>
+                              <a:schemeClr val="tx1"/>
+                            </a:solidFill>
+                          </a:ln>
+                          <a:solidFill>
+                            <a:schemeClr val="tx1"/>
+                          </a:solidFill>
+                          <a:latin typeface="DengXian Light" panose="02010600030101010101" pitchFamily="2" charset="-122"/>
+                          <a:ea typeface="DengXian Light" panose="02010600030101010101" pitchFamily="2" charset="-122"/>
+                        </a:rPr>
+                        <a:t>[4:0]</a:t>
                       </a:r>
                       <a:endParaRPr lang="zh-CN" altLang="en-US" b="0" i="0" dirty="0">
                         <a:ln>

</xml_diff>